<commit_message>
script cleanup and slide tweaks
</commit_message>
<xml_diff>
--- a/jimmysch-mix10.pptx
+++ b/jimmysch-mix10.pptx
@@ -7122,24 +7122,10 @@
           <a:lstStyle/>
           <a:p>
             <a:r>
-              <a:rPr lang="en-US" sz="8800" dirty="0" smtClean="0">
-                <a:solidFill>
-                  <a:schemeClr val="tx1">
-                    <a:lumMod val="85000"/>
-                    <a:lumOff val="15000"/>
-                  </a:schemeClr>
-                </a:solidFill>
-              </a:rPr>
+              <a:rPr lang="en-US" sz="8800" dirty="0" smtClean="0"/>
               <a:t>Ruby</a:t>
             </a:r>
-            <a:endParaRPr lang="en-US" sz="8800" dirty="0">
-              <a:solidFill>
-                <a:schemeClr val="tx1">
-                  <a:lumMod val="85000"/>
-                  <a:lumOff val="15000"/>
-                </a:schemeClr>
-              </a:solidFill>
-            </a:endParaRPr>
+            <a:endParaRPr lang="en-US" sz="8800" dirty="0"/>
           </a:p>
         </p:txBody>
       </p:sp>
@@ -8755,24 +8741,10 @@
           <a:lstStyle/>
           <a:p>
             <a:r>
-              <a:rPr lang="en-US" sz="6000" dirty="0" err="1" smtClean="0">
-                <a:solidFill>
-                  <a:schemeClr val="tx1">
-                    <a:lumMod val="85000"/>
-                    <a:lumOff val="15000"/>
-                  </a:schemeClr>
-                </a:solidFill>
-              </a:rPr>
+              <a:rPr lang="en-US" sz="6000" dirty="0" err="1" smtClean="0"/>
               <a:t>IronRuby</a:t>
             </a:r>
-            <a:endParaRPr lang="en-US" sz="6000" dirty="0">
-              <a:solidFill>
-                <a:schemeClr val="tx1">
-                  <a:lumMod val="85000"/>
-                  <a:lumOff val="15000"/>
-                </a:schemeClr>
-              </a:solidFill>
-            </a:endParaRPr>
+            <a:endParaRPr lang="en-US" sz="6000" dirty="0"/>
           </a:p>
         </p:txBody>
       </p:sp>
@@ -12563,7 +12535,7 @@
 
 <file path=ppt/tags/tag1.xml><?xml version="1.0" encoding="utf-8"?>
 <p:tagLst xmlns:a="http://schemas.openxmlformats.org/drawingml/2006/main" xmlns:r="http://schemas.openxmlformats.org/officeDocument/2006/relationships" xmlns:p="http://schemas.openxmlformats.org/presentationml/2006/main">
-  <p:tag name="PLEXMETADATA" val="&lt;?xml version=&quot;1.0&quot; encoding=&quot;utf-16&quot;?&gt;&#10;&lt;PresentationMetadata xmlns:xsi=&quot;http://www.w3.org/2001/XMLSchema-instance&quot; xmlns:xsd=&quot;http://www.w3.org/2001/XMLSchema&quot;&gt;&#10;  &lt;TransitionType&gt;Bounce&lt;/TransitionType&gt;&#10;  &lt;UniqueID&gt;0&lt;/UniqueID&gt;&#10;  &lt;ShowPreviews&gt;true&lt;/ShowPreviews&gt;&#10;  &lt;ShowReviews&gt;true&lt;/ShowReviews&gt;&#10;  &lt;SectionTemplate&gt;Template2&lt;/SectionTemplate&gt;&#10;  &lt;SectionTemplateColor&gt;&#10;    &lt;A&gt;255&lt;/A&gt;&#10;    &lt;R&gt;128&lt;/R&gt;&#10;    &lt;G&gt;128&lt;/G&gt;&#10;    &lt;B&gt;128&lt;/B&gt;&#10;    &lt;ScA&gt;1&lt;/ScA&gt;&#10;    &lt;ScR&gt;0.2158605&lt;/ScR&gt;&#10;    &lt;ScG&gt;0.2158605&lt;/ScG&gt;&#10;    &lt;ScB&gt;0.2158605&lt;/ScB&gt;&#10;  &lt;/SectionTemplateColor&gt;&#10;  &lt;SectionArrangement&gt;Simple&lt;/SectionArrangement&gt;&#10;&lt;/PresentationMetadata&gt;"/>
+  <p:tag name="PLEXMETADATA" val="&lt;?xml version=&quot;1.0&quot; encoding=&quot;utf-16&quot;?&gt;&#10;&lt;PresentationMetadata xmlns:xsi=&quot;http://www.w3.org/2001/XMLSchema-instance&quot; xmlns:xsd=&quot;http://www.w3.org/2001/XMLSchema&quot;&gt;&#10;  &lt;TransitionType&gt;Direct&lt;/TransitionType&gt;&#10;  &lt;UniqueID&gt;0&lt;/UniqueID&gt;&#10;  &lt;ShowPreviews&gt;true&lt;/ShowPreviews&gt;&#10;  &lt;ShowReviews&gt;true&lt;/ShowReviews&gt;&#10;  &lt;SectionTemplate&gt;Template2&lt;/SectionTemplate&gt;&#10;  &lt;SectionTemplateColor&gt;&#10;    &lt;A&gt;255&lt;/A&gt;&#10;    &lt;R&gt;128&lt;/R&gt;&#10;    &lt;G&gt;128&lt;/G&gt;&#10;    &lt;B&gt;128&lt;/B&gt;&#10;    &lt;ScA&gt;1&lt;/ScA&gt;&#10;    &lt;ScR&gt;0.2158605&lt;/ScR&gt;&#10;    &lt;ScG&gt;0.2158605&lt;/ScG&gt;&#10;    &lt;ScB&gt;0.2158605&lt;/ScB&gt;&#10;  &lt;/SectionTemplateColor&gt;&#10;  &lt;SectionArrangement&gt;Simple&lt;/SectionArrangement&gt;&#10;&lt;/PresentationMetadata&gt;"/>
 </p:tagLst>
 </file>
 

</xml_diff>